<commit_message>
Arreglo De Presentacion En Power Point
</commit_message>
<xml_diff>
--- a/DOCUMENTACION DE MASTER BARBER/ENTREGABLES 3/Entregables Proyecto B.pptx
+++ b/DOCUMENTACION DE MASTER BARBER/ENTREGABLES 3/Entregables Proyecto B.pptx
@@ -5,7 +5,7 @@
     <p:sldMasterId id="2147483648" r:id="rId1"/>
   </p:sldMasterIdLst>
   <p:notesMasterIdLst>
-    <p:notesMasterId r:id="rId21"/>
+    <p:notesMasterId r:id="rId23"/>
   </p:notesMasterIdLst>
   <p:sldIdLst>
     <p:sldId id="256" r:id="rId2"/>
@@ -26,24 +26,26 @@
     <p:sldId id="264" r:id="rId17"/>
     <p:sldId id="265" r:id="rId18"/>
     <p:sldId id="266" r:id="rId19"/>
-    <p:sldId id="284" r:id="rId20"/>
+    <p:sldId id="299" r:id="rId20"/>
+    <p:sldId id="300" r:id="rId21"/>
+    <p:sldId id="284" r:id="rId22"/>
   </p:sldIdLst>
   <p:sldSz cx="12192000" cy="6858000"/>
   <p:notesSz cx="6858000" cy="9144000"/>
   <p:embeddedFontLst>
     <p:embeddedFont>
       <p:font typeface="Work Sans" pitchFamily="2" charset="0"/>
-      <p:regular r:id="rId22"/>
-      <p:bold r:id="rId23"/>
-      <p:italic r:id="rId24"/>
-      <p:boldItalic r:id="rId25"/>
+      <p:regular r:id="rId24"/>
+      <p:bold r:id="rId25"/>
+      <p:italic r:id="rId26"/>
+      <p:boldItalic r:id="rId27"/>
     </p:embeddedFont>
     <p:embeddedFont>
       <p:font typeface="Work Sans Medium" pitchFamily="2" charset="0"/>
-      <p:regular r:id="rId26"/>
-      <p:bold r:id="rId27"/>
-      <p:italic r:id="rId28"/>
-      <p:boldItalic r:id="rId29"/>
+      <p:regular r:id="rId28"/>
+      <p:bold r:id="rId29"/>
+      <p:italic r:id="rId30"/>
+      <p:boldItalic r:id="rId31"/>
     </p:embeddedFont>
   </p:embeddedFontLst>
   <p:defaultTextStyle>
@@ -296,7 +298,7 @@
       </p15:sldGuideLst>
     </p:ext>
     <p:ext uri="GoogleSlidesCustomDataVersion2">
-      <go:slidesCustomData xmlns:go="http://customooxmlschemas.google.com/" xmlns:ahyp="http://schemas.microsoft.com/office/drawing/2018/hyperlinkcolor" xmlns:p15="http://schemas.microsoft.com/office/powerpoint/2012/main" xmlns:p14="http://schemas.microsoft.com/office/powerpoint/2010/main" xmlns:com="http://schemas.openxmlformats.org/drawingml/2006/compatibility" xmlns:pvml="urn:schemas-microsoft-com:office:powerpoint" xmlns:v="urn:schemas-microsoft-com:vml" xmlns:o="urn:schemas-microsoft-com:office:office" xmlns:dgm="http://schemas.openxmlformats.org/drawingml/2006/diagram" xmlns:c="http://schemas.openxmlformats.org/drawingml/2006/chart" xmlns:mv="urn:schemas-microsoft-com:mac:vml" xmlns:mc="http://schemas.openxmlformats.org/markup-compatibility/2006" xmlns="" r:id="rId47" roundtripDataSignature="AMtx7mi7HwvW2x/uPdzjakfDI4jAB7LRKg=="/>
+      <go:slidesCustomData xmlns="" xmlns:mc="http://schemas.openxmlformats.org/markup-compatibility/2006" xmlns:mv="urn:schemas-microsoft-com:mac:vml" xmlns:c="http://schemas.openxmlformats.org/drawingml/2006/chart" xmlns:dgm="http://schemas.openxmlformats.org/drawingml/2006/diagram" xmlns:o="urn:schemas-microsoft-com:office:office" xmlns:v="urn:schemas-microsoft-com:vml" xmlns:pvml="urn:schemas-microsoft-com:office:powerpoint" xmlns:com="http://schemas.openxmlformats.org/drawingml/2006/compatibility" xmlns:p14="http://schemas.microsoft.com/office/powerpoint/2010/main" xmlns:p15="http://schemas.microsoft.com/office/powerpoint/2012/main" xmlns:ahyp="http://schemas.microsoft.com/office/drawing/2018/hyperlinkcolor" xmlns:go="http://customooxmlschemas.google.com/" r:id="rId47" roundtripDataSignature="AMtx7mi7HwvW2x/uPdzjakfDI4jAB7LRKg=="/>
     </p:ext>
   </p:extLst>
 </p:presentation>
@@ -2609,7 +2611,7 @@
   <p:cSld>
     <p:spTree>
       <p:nvGrpSpPr>
-        <p:cNvPr id="1" name="Shape 280"/>
+        <p:cNvPr id="1" name="Shape 154"/>
         <p:cNvGrpSpPr/>
         <p:nvPr/>
       </p:nvGrpSpPr>
@@ -2623,7 +2625,7 @@
       </p:grpSpPr>
       <p:sp>
         <p:nvSpPr>
-          <p:cNvPr id="281" name="Google Shape;281;p29:notes"/>
+          <p:cNvPr id="155" name="Google Shape;155;p10:notes"/>
           <p:cNvSpPr txBox="1">
             <a:spLocks noGrp="1"/>
           </p:cNvSpPr>
@@ -2661,7 +2663,7 @@
       </p:sp>
       <p:sp>
         <p:nvSpPr>
-          <p:cNvPr id="282" name="Google Shape;282;p29:notes"/>
+          <p:cNvPr id="156" name="Google Shape;156;p10:notes"/>
           <p:cNvSpPr>
             <a:spLocks noGrp="1" noRot="1" noChangeAspect="1"/>
           </p:cNvSpPr>
@@ -2701,6 +2703,11 @@
         </p:spPr>
       </p:sp>
     </p:spTree>
+    <p:extLst>
+      <p:ext uri="{BB962C8B-B14F-4D97-AF65-F5344CB8AC3E}">
+        <p14:creationId xmlns:p14="http://schemas.microsoft.com/office/powerpoint/2010/main" val="547870223"/>
+      </p:ext>
+    </p:extLst>
   </p:cSld>
   <p:clrMapOvr>
     <a:masterClrMapping/>
@@ -2766,6 +2773,219 @@
       <p:sp>
         <p:nvSpPr>
           <p:cNvPr id="99" name="Google Shape;99;p2:notes"/>
+          <p:cNvSpPr>
+            <a:spLocks noGrp="1" noRot="1" noChangeAspect="1"/>
+          </p:cNvSpPr>
+          <p:nvPr>
+            <p:ph type="sldImg" idx="2"/>
+          </p:nvPr>
+        </p:nvSpPr>
+        <p:spPr>
+          <a:xfrm>
+            <a:off x="685800" y="1143000"/>
+            <a:ext cx="5486400" cy="3086100"/>
+          </a:xfrm>
+          <a:custGeom>
+            <a:avLst/>
+            <a:gdLst/>
+            <a:ahLst/>
+            <a:cxnLst/>
+            <a:rect l="l" t="t" r="r" b="b"/>
+            <a:pathLst>
+              <a:path w="120000" h="120000" extrusionOk="0">
+                <a:moveTo>
+                  <a:pt x="0" y="0"/>
+                </a:moveTo>
+                <a:lnTo>
+                  <a:pt x="120000" y="0"/>
+                </a:lnTo>
+                <a:lnTo>
+                  <a:pt x="120000" y="120000"/>
+                </a:lnTo>
+                <a:lnTo>
+                  <a:pt x="0" y="120000"/>
+                </a:lnTo>
+                <a:close/>
+              </a:path>
+            </a:pathLst>
+          </a:custGeom>
+        </p:spPr>
+      </p:sp>
+    </p:spTree>
+  </p:cSld>
+  <p:clrMapOvr>
+    <a:masterClrMapping/>
+  </p:clrMapOvr>
+</p:notes>
+</file>
+
+<file path=ppt/notesSlides/notesSlide20.xml><?xml version="1.0" encoding="utf-8"?>
+<p:notes xmlns:a="http://schemas.openxmlformats.org/drawingml/2006/main" xmlns:r="http://schemas.openxmlformats.org/officeDocument/2006/relationships" xmlns:p="http://schemas.openxmlformats.org/presentationml/2006/main" showMasterSp="0" showMasterPhAnim="0">
+  <p:cSld>
+    <p:spTree>
+      <p:nvGrpSpPr>
+        <p:cNvPr id="1" name="Shape 161"/>
+        <p:cNvGrpSpPr/>
+        <p:nvPr/>
+      </p:nvGrpSpPr>
+      <p:grpSpPr>
+        <a:xfrm>
+          <a:off x="0" y="0"/>
+          <a:ext cx="0" cy="0"/>
+          <a:chOff x="0" y="0"/>
+          <a:chExt cx="0" cy="0"/>
+        </a:xfrm>
+      </p:grpSpPr>
+      <p:sp>
+        <p:nvSpPr>
+          <p:cNvPr id="162" name="Google Shape;162;p11:notes"/>
+          <p:cNvSpPr txBox="1">
+            <a:spLocks noGrp="1"/>
+          </p:cNvSpPr>
+          <p:nvPr>
+            <p:ph type="body" idx="1"/>
+          </p:nvPr>
+        </p:nvSpPr>
+        <p:spPr>
+          <a:xfrm>
+            <a:off x="685800" y="4400550"/>
+            <a:ext cx="5486400" cy="3600450"/>
+          </a:xfrm>
+          <a:prstGeom prst="rect">
+            <a:avLst/>
+          </a:prstGeom>
+        </p:spPr>
+        <p:txBody>
+          <a:bodyPr spcFirstLastPara="1" wrap="square" lIns="91425" tIns="45700" rIns="91425" bIns="45700" anchor="t" anchorCtr="0">
+            <a:noAutofit/>
+          </a:bodyPr>
+          <a:lstStyle/>
+          <a:p>
+            <a:pPr marL="0" lvl="0" indent="0" algn="l" rtl="0">
+              <a:spcBef>
+                <a:spcPts val="0"/>
+              </a:spcBef>
+              <a:spcAft>
+                <a:spcPts val="0"/>
+              </a:spcAft>
+              <a:buNone/>
+            </a:pPr>
+            <a:endParaRPr/>
+          </a:p>
+        </p:txBody>
+      </p:sp>
+      <p:sp>
+        <p:nvSpPr>
+          <p:cNvPr id="163" name="Google Shape;163;p11:notes"/>
+          <p:cNvSpPr>
+            <a:spLocks noGrp="1" noRot="1" noChangeAspect="1"/>
+          </p:cNvSpPr>
+          <p:nvPr>
+            <p:ph type="sldImg" idx="2"/>
+          </p:nvPr>
+        </p:nvSpPr>
+        <p:spPr>
+          <a:xfrm>
+            <a:off x="685800" y="1143000"/>
+            <a:ext cx="5486400" cy="3086100"/>
+          </a:xfrm>
+          <a:custGeom>
+            <a:avLst/>
+            <a:gdLst/>
+            <a:ahLst/>
+            <a:cxnLst/>
+            <a:rect l="l" t="t" r="r" b="b"/>
+            <a:pathLst>
+              <a:path w="120000" h="120000" extrusionOk="0">
+                <a:moveTo>
+                  <a:pt x="0" y="0"/>
+                </a:moveTo>
+                <a:lnTo>
+                  <a:pt x="120000" y="0"/>
+                </a:lnTo>
+                <a:lnTo>
+                  <a:pt x="120000" y="120000"/>
+                </a:lnTo>
+                <a:lnTo>
+                  <a:pt x="0" y="120000"/>
+                </a:lnTo>
+                <a:close/>
+              </a:path>
+            </a:pathLst>
+          </a:custGeom>
+        </p:spPr>
+      </p:sp>
+    </p:spTree>
+    <p:extLst>
+      <p:ext uri="{BB962C8B-B14F-4D97-AF65-F5344CB8AC3E}">
+        <p14:creationId xmlns:p14="http://schemas.microsoft.com/office/powerpoint/2010/main" val="426601461"/>
+      </p:ext>
+    </p:extLst>
+  </p:cSld>
+  <p:clrMapOvr>
+    <a:masterClrMapping/>
+  </p:clrMapOvr>
+</p:notes>
+</file>
+
+<file path=ppt/notesSlides/notesSlide21.xml><?xml version="1.0" encoding="utf-8"?>
+<p:notes xmlns:a="http://schemas.openxmlformats.org/drawingml/2006/main" xmlns:r="http://schemas.openxmlformats.org/officeDocument/2006/relationships" xmlns:p="http://schemas.openxmlformats.org/presentationml/2006/main" showMasterSp="0" showMasterPhAnim="0">
+  <p:cSld>
+    <p:spTree>
+      <p:nvGrpSpPr>
+        <p:cNvPr id="1" name="Shape 280"/>
+        <p:cNvGrpSpPr/>
+        <p:nvPr/>
+      </p:nvGrpSpPr>
+      <p:grpSpPr>
+        <a:xfrm>
+          <a:off x="0" y="0"/>
+          <a:ext cx="0" cy="0"/>
+          <a:chOff x="0" y="0"/>
+          <a:chExt cx="0" cy="0"/>
+        </a:xfrm>
+      </p:grpSpPr>
+      <p:sp>
+        <p:nvSpPr>
+          <p:cNvPr id="281" name="Google Shape;281;p29:notes"/>
+          <p:cNvSpPr txBox="1">
+            <a:spLocks noGrp="1"/>
+          </p:cNvSpPr>
+          <p:nvPr>
+            <p:ph type="body" idx="1"/>
+          </p:nvPr>
+        </p:nvSpPr>
+        <p:spPr>
+          <a:xfrm>
+            <a:off x="685800" y="4400550"/>
+            <a:ext cx="5486400" cy="3600450"/>
+          </a:xfrm>
+          <a:prstGeom prst="rect">
+            <a:avLst/>
+          </a:prstGeom>
+        </p:spPr>
+        <p:txBody>
+          <a:bodyPr spcFirstLastPara="1" wrap="square" lIns="91425" tIns="45700" rIns="91425" bIns="45700" anchor="t" anchorCtr="0">
+            <a:noAutofit/>
+          </a:bodyPr>
+          <a:lstStyle/>
+          <a:p>
+            <a:pPr marL="0" lvl="0" indent="0" algn="l" rtl="0">
+              <a:spcBef>
+                <a:spcPts val="0"/>
+              </a:spcBef>
+              <a:spcAft>
+                <a:spcPts val="0"/>
+              </a:spcAft>
+              <a:buNone/>
+            </a:pPr>
+            <a:endParaRPr/>
+          </a:p>
+        </p:txBody>
+      </p:sp>
+      <p:sp>
+        <p:nvSpPr>
+          <p:cNvPr id="282" name="Google Shape;282;p29:notes"/>
           <p:cNvSpPr>
             <a:spLocks noGrp="1" noRot="1" noChangeAspect="1"/>
           </p:cNvSpPr>
@@ -15973,8 +16193,8 @@
         </p:nvSpPr>
         <p:spPr>
           <a:xfrm>
-            <a:off x="2040890" y="6007901"/>
-            <a:ext cx="8169910" cy="523220"/>
+            <a:off x="1826959" y="6007901"/>
+            <a:ext cx="8169910" cy="261610"/>
           </a:xfrm>
           <a:prstGeom prst="rect">
             <a:avLst/>
@@ -15989,20 +16209,20 @@
           <a:p>
             <a:pPr algn="ctr"/>
             <a:r>
-              <a:rPr lang="en-US" dirty="0"/>
+              <a:rPr lang="en-US" sz="1100" dirty="0"/>
               <a:t>file:///C:/Users/Aprendiz/Documents/GitHub/Practicas/Mater%20Barber/</a:t>
             </a:r>
             <a:r>
-              <a:rPr lang="en-US" dirty="0">
+              <a:rPr lang="en-US" sz="1100" dirty="0">
                 <a:hlinkClick r:id="rId5" action="ppaction://hlinkfile"/>
               </a:rPr>
               <a:t>HTML-CSS</a:t>
             </a:r>
             <a:r>
-              <a:rPr lang="en-US" dirty="0"/>
+              <a:rPr lang="en-US" sz="1100" dirty="0"/>
               <a:t>/MASTER%20BARBER.html</a:t>
             </a:r>
-            <a:endParaRPr lang="es-CO" dirty="0"/>
+            <a:endParaRPr lang="es-CO" sz="1100" dirty="0"/>
           </a:p>
         </p:txBody>
       </p:sp>
@@ -16365,7 +16585,7 @@
         <p:spPr>
           <a:xfrm>
             <a:off x="5309756" y="6187966"/>
-            <a:ext cx="6657108" cy="307777"/>
+            <a:ext cx="6657108" cy="276999"/>
           </a:xfrm>
           <a:prstGeom prst="rect">
             <a:avLst/>
@@ -16379,7 +16599,7 @@
           <a:lstStyle/>
           <a:p>
             <a:r>
-              <a:rPr lang="es-CO" dirty="0"/>
+              <a:rPr lang="es-CO" sz="1200" dirty="0"/>
               <a:t>http://localhost:5173</a:t>
             </a:r>
           </a:p>
@@ -16411,7 +16631,7 @@
     </p:bg>
     <p:spTree>
       <p:nvGrpSpPr>
-        <p:cNvPr id="1" name="Shape 283"/>
+        <p:cNvPr id="1" name="Shape 157"/>
         <p:cNvGrpSpPr/>
         <p:nvPr/>
       </p:nvGrpSpPr>
@@ -16423,7 +16643,153 @@
           <a:chExt cx="0" cy="0"/>
         </a:xfrm>
       </p:grpSpPr>
+      <p:sp>
+        <p:nvSpPr>
+          <p:cNvPr id="158" name="Google Shape;158;p10"/>
+          <p:cNvSpPr/>
+          <p:nvPr/>
+        </p:nvSpPr>
+        <p:spPr>
+          <a:xfrm>
+            <a:off x="3423628" y="3954050"/>
+            <a:ext cx="5344743" cy="369332"/>
+          </a:xfrm>
+          <a:prstGeom prst="rect">
+            <a:avLst/>
+          </a:prstGeom>
+          <a:noFill/>
+          <a:ln>
+            <a:noFill/>
+          </a:ln>
+        </p:spPr>
+        <p:txBody>
+          <a:bodyPr spcFirstLastPara="1" wrap="square" lIns="91425" tIns="45700" rIns="91425" bIns="45700" anchor="t" anchorCtr="0">
+            <a:spAutoFit/>
+          </a:bodyPr>
+          <a:lstStyle/>
+          <a:p>
+            <a:pPr marL="0" marR="0" lvl="0" indent="0" algn="l" rtl="0">
+              <a:lnSpc>
+                <a:spcPct val="90000"/>
+              </a:lnSpc>
+              <a:spcBef>
+                <a:spcPts val="0"/>
+              </a:spcBef>
+              <a:spcAft>
+                <a:spcPts val="0"/>
+              </a:spcAft>
+              <a:buNone/>
+            </a:pPr>
+            <a:endParaRPr sz="2000">
+              <a:solidFill>
+                <a:schemeClr val="lt1"/>
+              </a:solidFill>
+              <a:latin typeface="Work Sans Medium"/>
+              <a:ea typeface="Work Sans Medium"/>
+              <a:cs typeface="Work Sans Medium"/>
+              <a:sym typeface="Work Sans Medium"/>
+            </a:endParaRPr>
+          </a:p>
+        </p:txBody>
+      </p:sp>
+      <p:sp>
+        <p:nvSpPr>
+          <p:cNvPr id="159" name="Google Shape;159;p10"/>
+          <p:cNvSpPr txBox="1"/>
+          <p:nvPr/>
+        </p:nvSpPr>
+        <p:spPr>
+          <a:xfrm>
+            <a:off x="-534041" y="2623935"/>
+            <a:ext cx="13490187" cy="830997"/>
+          </a:xfrm>
+          <a:prstGeom prst="rect">
+            <a:avLst/>
+          </a:prstGeom>
+          <a:noFill/>
+          <a:ln>
+            <a:noFill/>
+          </a:ln>
+        </p:spPr>
+        <p:txBody>
+          <a:bodyPr spcFirstLastPara="1" wrap="square" lIns="91425" tIns="45700" rIns="91425" bIns="45700" anchor="t" anchorCtr="0">
+            <a:spAutoFit/>
+          </a:bodyPr>
+          <a:lstStyle/>
+          <a:p>
+            <a:pPr marL="0" marR="0" lvl="0" indent="0" algn="ctr" rtl="0">
+              <a:lnSpc>
+                <a:spcPct val="100000"/>
+              </a:lnSpc>
+              <a:spcBef>
+                <a:spcPts val="0"/>
+              </a:spcBef>
+              <a:spcAft>
+                <a:spcPts val="0"/>
+              </a:spcAft>
+              <a:buClr>
+                <a:schemeClr val="lt1"/>
+              </a:buClr>
+              <a:buSzPts val="4800"/>
+              <a:buFont typeface="Work Sans"/>
+              <a:buNone/>
+            </a:pPr>
+            <a:r>
+              <a:rPr lang="es-ES" sz="4800" b="1" dirty="0">
+                <a:solidFill>
+                  <a:schemeClr val="lt1"/>
+                </a:solidFill>
+                <a:latin typeface="Work Sans"/>
+                <a:ea typeface="Work Sans"/>
+                <a:cs typeface="Work Sans"/>
+                <a:sym typeface="Work Sans"/>
+              </a:rPr>
+              <a:t>CONTROL DE VERSIONES</a:t>
+            </a:r>
+            <a:endParaRPr sz="4800" b="1" u="none" strike="noStrike" cap="none" dirty="0">
+              <a:solidFill>
+                <a:schemeClr val="lt1"/>
+              </a:solidFill>
+              <a:latin typeface="Work Sans"/>
+              <a:ea typeface="Work Sans"/>
+              <a:cs typeface="Work Sans"/>
+              <a:sym typeface="Work Sans"/>
+            </a:endParaRPr>
+          </a:p>
+        </p:txBody>
+      </p:sp>
+      <p:cxnSp>
+        <p:nvCxnSpPr>
+          <p:cNvPr id="160" name="Google Shape;160;p10"/>
+          <p:cNvCxnSpPr/>
+          <p:nvPr/>
+        </p:nvCxnSpPr>
+        <p:spPr>
+          <a:xfrm>
+            <a:off x="5013630" y="3555133"/>
+            <a:ext cx="2247544" cy="0"/>
+          </a:xfrm>
+          <a:prstGeom prst="straightConnector1">
+            <a:avLst/>
+          </a:prstGeom>
+          <a:noFill/>
+          <a:ln w="12700" cap="flat" cmpd="sng">
+            <a:solidFill>
+              <a:schemeClr val="lt1"/>
+            </a:solidFill>
+            <a:prstDash val="solid"/>
+            <a:miter lim="800000"/>
+            <a:headEnd type="none" w="sm" len="sm"/>
+            <a:tailEnd type="none" w="sm" len="sm"/>
+          </a:ln>
+        </p:spPr>
+      </p:cxnSp>
     </p:spTree>
+    <p:extLst>
+      <p:ext uri="{BB962C8B-B14F-4D97-AF65-F5344CB8AC3E}">
+        <p14:creationId xmlns:p14="http://schemas.microsoft.com/office/powerpoint/2010/main" val="1284888881"/>
+      </p:ext>
+    </p:extLst>
   </p:cSld>
   <p:clrMapOvr>
     <a:masterClrMapping/>
@@ -16593,6 +16959,249 @@
           </a:ln>
         </p:spPr>
       </p:cxnSp>
+    </p:spTree>
+  </p:cSld>
+  <p:clrMapOvr>
+    <a:masterClrMapping/>
+  </p:clrMapOvr>
+</p:sld>
+</file>
+
+<file path=ppt/slides/slide20.xml><?xml version="1.0" encoding="utf-8"?>
+<p:sld xmlns:a="http://schemas.openxmlformats.org/drawingml/2006/main" xmlns:r="http://schemas.openxmlformats.org/officeDocument/2006/relationships" xmlns:p="http://schemas.openxmlformats.org/presentationml/2006/main">
+  <p:cSld>
+    <p:bg>
+      <p:bgPr>
+        <a:blipFill>
+          <a:blip r:embed="rId3">
+            <a:alphaModFix/>
+          </a:blip>
+          <a:stretch>
+            <a:fillRect/>
+          </a:stretch>
+        </a:blipFill>
+        <a:effectLst/>
+      </p:bgPr>
+    </p:bg>
+    <p:spTree>
+      <p:nvGrpSpPr>
+        <p:cNvPr id="1" name="Shape 164"/>
+        <p:cNvGrpSpPr/>
+        <p:nvPr/>
+      </p:nvGrpSpPr>
+      <p:grpSpPr>
+        <a:xfrm>
+          <a:off x="0" y="0"/>
+          <a:ext cx="0" cy="0"/>
+          <a:chOff x="0" y="0"/>
+          <a:chExt cx="0" cy="0"/>
+        </a:xfrm>
+      </p:grpSpPr>
+      <p:sp>
+        <p:nvSpPr>
+          <p:cNvPr id="165" name="Google Shape;165;p11"/>
+          <p:cNvSpPr txBox="1"/>
+          <p:nvPr/>
+        </p:nvSpPr>
+        <p:spPr>
+          <a:xfrm>
+            <a:off x="-1124001" y="796782"/>
+            <a:ext cx="8458993" cy="769441"/>
+          </a:xfrm>
+          <a:prstGeom prst="rect">
+            <a:avLst/>
+          </a:prstGeom>
+          <a:noFill/>
+          <a:ln>
+            <a:noFill/>
+          </a:ln>
+        </p:spPr>
+        <p:txBody>
+          <a:bodyPr spcFirstLastPara="1" wrap="square" lIns="91425" tIns="45700" rIns="91425" bIns="45700" anchor="t" anchorCtr="0">
+            <a:spAutoFit/>
+          </a:bodyPr>
+          <a:lstStyle/>
+          <a:p>
+            <a:pPr marL="0" marR="0" lvl="0" indent="0" algn="l" rtl="0">
+              <a:spcBef>
+                <a:spcPts val="0"/>
+              </a:spcBef>
+              <a:spcAft>
+                <a:spcPts val="0"/>
+              </a:spcAft>
+              <a:buNone/>
+            </a:pPr>
+            <a:r>
+              <a:rPr lang="es-ES" sz="4400" b="1" dirty="0">
+                <a:solidFill>
+                  <a:srgbClr val="38AA00"/>
+                </a:solidFill>
+                <a:latin typeface="Work Sans"/>
+                <a:ea typeface="Work Sans"/>
+                <a:cs typeface="Work Sans"/>
+                <a:sym typeface="Work Sans"/>
+              </a:rPr>
+              <a:t>		</a:t>
+            </a:r>
+            <a:r>
+              <a:rPr lang="es-ES" sz="4000" b="1" dirty="0">
+                <a:solidFill>
+                  <a:srgbClr val="38AA00"/>
+                </a:solidFill>
+                <a:latin typeface="Work Sans"/>
+                <a:ea typeface="Work Sans"/>
+                <a:cs typeface="Work Sans"/>
+                <a:sym typeface="Work Sans"/>
+              </a:rPr>
+              <a:t>CONTROL DE VERSIONES</a:t>
+            </a:r>
+            <a:endParaRPr sz="4000" b="1" dirty="0">
+              <a:solidFill>
+                <a:srgbClr val="38AA00"/>
+              </a:solidFill>
+              <a:latin typeface="Times New Roman"/>
+              <a:ea typeface="Times New Roman"/>
+              <a:cs typeface="Times New Roman"/>
+              <a:sym typeface="Times New Roman"/>
+            </a:endParaRPr>
+          </a:p>
+        </p:txBody>
+      </p:sp>
+      <p:cxnSp>
+        <p:nvCxnSpPr>
+          <p:cNvPr id="166" name="Google Shape;166;p11"/>
+          <p:cNvCxnSpPr/>
+          <p:nvPr/>
+        </p:nvCxnSpPr>
+        <p:spPr>
+          <a:xfrm>
+            <a:off x="857952" y="1433839"/>
+            <a:ext cx="2247544" cy="0"/>
+          </a:xfrm>
+          <a:prstGeom prst="straightConnector1">
+            <a:avLst/>
+          </a:prstGeom>
+          <a:noFill/>
+          <a:ln w="12700" cap="flat" cmpd="sng">
+            <a:solidFill>
+              <a:srgbClr val="38AA00"/>
+            </a:solidFill>
+            <a:prstDash val="solid"/>
+            <a:miter lim="800000"/>
+            <a:headEnd type="none" w="sm" len="sm"/>
+            <a:tailEnd type="none" w="sm" len="sm"/>
+          </a:ln>
+        </p:spPr>
+      </p:cxnSp>
+      <p:pic>
+        <p:nvPicPr>
+          <p:cNvPr id="5" name="Imagen 4">
+            <a:extLst>
+              <a:ext uri="{FF2B5EF4-FFF2-40B4-BE49-F238E27FC236}">
+                <a16:creationId xmlns:a16="http://schemas.microsoft.com/office/drawing/2014/main" id="{E8CF4EF5-47F8-E217-4346-DBEEDFE93288}"/>
+              </a:ext>
+            </a:extLst>
+          </p:cNvPr>
+          <p:cNvPicPr>
+            <a:picLocks noChangeAspect="1"/>
+          </p:cNvPicPr>
+          <p:nvPr/>
+        </p:nvPicPr>
+        <p:blipFill>
+          <a:blip r:embed="rId4"/>
+          <a:stretch>
+            <a:fillRect/>
+          </a:stretch>
+        </p:blipFill>
+        <p:spPr>
+          <a:xfrm>
+            <a:off x="1745810" y="1629623"/>
+            <a:ext cx="8557034" cy="4010685"/>
+          </a:xfrm>
+          <a:prstGeom prst="rect">
+            <a:avLst/>
+          </a:prstGeom>
+        </p:spPr>
+      </p:pic>
+      <p:sp>
+        <p:nvSpPr>
+          <p:cNvPr id="7" name="CuadroTexto 6">
+            <a:hlinkClick r:id="rId5"/>
+            <a:extLst>
+              <a:ext uri="{FF2B5EF4-FFF2-40B4-BE49-F238E27FC236}">
+                <a16:creationId xmlns:a16="http://schemas.microsoft.com/office/drawing/2014/main" id="{D9C85CE8-983B-9F66-DEAF-3703C6A61703}"/>
+              </a:ext>
+            </a:extLst>
+          </p:cNvPr>
+          <p:cNvSpPr txBox="1"/>
+          <p:nvPr/>
+        </p:nvSpPr>
+        <p:spPr>
+          <a:xfrm>
+            <a:off x="4171384" y="5922718"/>
+            <a:ext cx="6658824" cy="276999"/>
+          </a:xfrm>
+          <a:prstGeom prst="rect">
+            <a:avLst/>
+          </a:prstGeom>
+          <a:noFill/>
+        </p:spPr>
+        <p:txBody>
+          <a:bodyPr wrap="square">
+            <a:spAutoFit/>
+          </a:bodyPr>
+          <a:lstStyle/>
+          <a:p>
+            <a:r>
+              <a:rPr lang="es-CO" sz="1200" dirty="0"/>
+              <a:t>https://github.com/FidelSmoke/Practicas</a:t>
+            </a:r>
+          </a:p>
+        </p:txBody>
+      </p:sp>
+    </p:spTree>
+    <p:extLst>
+      <p:ext uri="{BB962C8B-B14F-4D97-AF65-F5344CB8AC3E}">
+        <p14:creationId xmlns:p14="http://schemas.microsoft.com/office/powerpoint/2010/main" val="889433949"/>
+      </p:ext>
+    </p:extLst>
+  </p:cSld>
+  <p:clrMapOvr>
+    <a:masterClrMapping/>
+  </p:clrMapOvr>
+</p:sld>
+</file>
+
+<file path=ppt/slides/slide21.xml><?xml version="1.0" encoding="utf-8"?>
+<p:sld xmlns:a="http://schemas.openxmlformats.org/drawingml/2006/main" xmlns:r="http://schemas.openxmlformats.org/officeDocument/2006/relationships" xmlns:p="http://schemas.openxmlformats.org/presentationml/2006/main">
+  <p:cSld>
+    <p:bg>
+      <p:bgPr>
+        <a:blipFill>
+          <a:blip r:embed="rId3">
+            <a:alphaModFix/>
+          </a:blip>
+          <a:stretch>
+            <a:fillRect/>
+          </a:stretch>
+        </a:blipFill>
+        <a:effectLst/>
+      </p:bgPr>
+    </p:bg>
+    <p:spTree>
+      <p:nvGrpSpPr>
+        <p:cNvPr id="1" name="Shape 283"/>
+        <p:cNvGrpSpPr/>
+        <p:nvPr/>
+      </p:nvGrpSpPr>
+      <p:grpSpPr>
+        <a:xfrm>
+          <a:off x="0" y="0"/>
+          <a:ext cx="0" cy="0"/>
+          <a:chOff x="0" y="0"/>
+          <a:chExt cx="0" cy="0"/>
+        </a:xfrm>
+      </p:grpSpPr>
     </p:spTree>
   </p:cSld>
   <p:clrMapOvr>
@@ -17752,8 +18361,8 @@
         </p:nvSpPr>
         <p:spPr>
           <a:xfrm>
-            <a:off x="2729346" y="5936328"/>
-            <a:ext cx="6733308" cy="738664"/>
+            <a:off x="2847041" y="6065817"/>
+            <a:ext cx="6733308" cy="276999"/>
           </a:xfrm>
           <a:prstGeom prst="rect">
             <a:avLst/>
@@ -17768,16 +18377,12 @@
           <a:p>
             <a:pPr algn="ctr"/>
             <a:r>
-              <a:rPr lang="es-CO" dirty="0"/>
-              <a:t>http://localhost/phpmyadmin/index.php?route=/database/structure&amp;db=master_barber</a:t>
-            </a:r>
-            <a:r>
-              <a:rPr lang="es-CO" dirty="0">
+              <a:rPr lang="es-CO" sz="1200" dirty="0">
                 <a:hlinkClick r:id="rId5"/>
               </a:rPr>
-              <a:t>http://localhost/phpmyadmin/index.php?route=/database/structure&amp;db=master_barber</a:t>
+              <a:t>//localhost/phpmyadmin/index.php?route=/database/structure&amp;db=master_barber</a:t>
             </a:r>
-            <a:endParaRPr lang="es-CO" dirty="0"/>
+            <a:endParaRPr lang="es-CO" sz="1200" dirty="0"/>
           </a:p>
         </p:txBody>
       </p:sp>

</xml_diff>